<commit_message>
Percentage examples in data-viz-02
</commit_message>
<xml_diff>
--- a/data-viz-02/component/recommendations-barcharts.pptx
+++ b/data-viz-02/component/recommendations-barcharts.pptx
@@ -5,7 +5,7 @@
     <p:sldMasterId id="2147483648" r:id="rId1"/>
   </p:sldMasterIdLst>
   <p:notesMasterIdLst>
-    <p:NotesMasterId r:id="rId23"/>
+    <p:NotesMasterId r:id="rId25"/>
   </p:notesMasterIdLst>
   <p:sldIdLst>
     <p:sldId id="256" r:id="rId2"/>
@@ -29,6 +29,8 @@
     <p:sldId id="274" r:id="rId20"/>
     <p:sldId id="275" r:id="rId21"/>
     <p:sldId id="276" r:id="rId22"/>
+    <p:sldId id="277" r:id="rId23"/>
+    <p:sldId id="278" r:id="rId24"/>
   </p:sldIdLst>
   <p:sldSz cx="9144000" cy="6858000" type="screen4x3"/>
   <p:notesSz cx="6858000" cy="9144000"/>
@@ -4726,6 +4728,952 @@
             <a:fld id="{18BDFEC3-8487-43E8-A154-7C12CBC1FFF2}" type="slidenum">
               <a:rPr lang="en-US"/>
               <a:t>15</a:t>
+            </a:fld>
+            <a:endParaRPr lang="en-US"/>
+          </a:p>
+        </p:txBody>
+      </p:sp>
+    </p:spTree>
+  </p:cSld>
+</p:notes>
+</file>
+
+<file path=ppt/notesSlides/notesSlide15.xml><?xml version="1.0" encoding="utf-8"?>
+<p:notes xmlns:a="http://schemas.openxmlformats.org/drawingml/2006/main" xmlns:r="http://schemas.openxmlformats.org/officeDocument/2006/relationships" xmlns:p="http://schemas.openxmlformats.org/presentationml/2006/main">
+  <p:cSld>
+    <p:spTree>
+      <p:nvGrpSpPr>
+        <p:cNvPr id="1" name=""/>
+        <p:cNvGrpSpPr/>
+        <p:nvPr/>
+      </p:nvGrpSpPr>
+      <p:grpSpPr>
+        <a:xfrm>
+          <a:off x="0" y="0"/>
+          <a:ext cx="0" cy="0"/>
+          <a:chOff x="0" y="0"/>
+          <a:chExt cx="0" cy="0"/>
+        </a:xfrm>
+      </p:grpSpPr>
+      <p:sp>
+        <p:nvSpPr>
+          <p:cNvPr id="2" name="Slide Image Placeholder 1"/>
+          <p:cNvSpPr>
+            <a:spLocks noGrp="1" noRot="1" noChangeAspect="1"/>
+          </p:cNvSpPr>
+          <p:nvPr>
+            <p:ph type="sldImg"/>
+          </p:nvPr>
+        </p:nvSpPr>
+        <p:spPr/>
+      </p:sp>
+      <p:sp>
+        <p:nvSpPr>
+          <p:cNvPr id="3" name="Notes Placeholder 2"/>
+          <p:cNvSpPr>
+            <a:spLocks noGrp="1"/>
+          </p:cNvSpPr>
+          <p:nvPr>
+            <p:ph type="body" idx="1"/>
+          </p:nvPr>
+        </p:nvSpPr>
+        <p:spPr/>
+        <p:txBody>
+          <a:bodyPr/>
+          <a:lstStyle/>
+          <a:p>
+            <a:pPr lvl="0" marL="0" indent="0">
+              <a:buNone/>
+            </a:pPr>
+            <a:r>
+              <a:rPr/>
+              <a:t>You</a:t>
+            </a:r>
+            <a:r>
+              <a:rPr/>
+              <a:t> </a:t>
+            </a:r>
+            <a:r>
+              <a:rPr/>
+              <a:t>can</a:t>
+            </a:r>
+            <a:r>
+              <a:rPr/>
+              <a:t> </a:t>
+            </a:r>
+            <a:r>
+              <a:rPr/>
+              <a:t>switch</a:t>
+            </a:r>
+            <a:r>
+              <a:rPr/>
+              <a:t> </a:t>
+            </a:r>
+            <a:r>
+              <a:rPr/>
+              <a:t>things</a:t>
+            </a:r>
+            <a:r>
+              <a:rPr/>
+              <a:t> </a:t>
+            </a:r>
+            <a:r>
+              <a:rPr/>
+              <a:t>so</a:t>
+            </a:r>
+            <a:r>
+              <a:rPr/>
+              <a:t> </a:t>
+            </a:r>
+            <a:r>
+              <a:rPr/>
+              <a:t>that</a:t>
+            </a:r>
+            <a:r>
+              <a:rPr/>
+              <a:t> </a:t>
+            </a:r>
+            <a:r>
+              <a:rPr/>
+              <a:t>gender</a:t>
+            </a:r>
+            <a:r>
+              <a:rPr/>
+              <a:t> </a:t>
+            </a:r>
+            <a:r>
+              <a:rPr/>
+              <a:t>is</a:t>
+            </a:r>
+            <a:r>
+              <a:rPr/>
+              <a:t> </a:t>
+            </a:r>
+            <a:r>
+              <a:rPr/>
+              <a:t>stacked</a:t>
+            </a:r>
+            <a:r>
+              <a:rPr/>
+              <a:t> </a:t>
+            </a:r>
+            <a:r>
+              <a:rPr/>
+              <a:t>for</a:t>
+            </a:r>
+            <a:r>
+              <a:rPr/>
+              <a:t> </a:t>
+            </a:r>
+            <a:r>
+              <a:rPr/>
+              <a:t>each</a:t>
+            </a:r>
+            <a:r>
+              <a:rPr/>
+              <a:t> </a:t>
+            </a:r>
+            <a:r>
+              <a:rPr/>
+              <a:t>passenger</a:t>
+            </a:r>
+            <a:r>
+              <a:rPr/>
+              <a:t> </a:t>
+            </a:r>
+            <a:r>
+              <a:rPr/>
+              <a:t>class.</a:t>
+            </a:r>
+            <a:r>
+              <a:rPr/>
+              <a:t> </a:t>
+            </a:r>
+            <a:r>
+              <a:rPr/>
+              <a:t>This</a:t>
+            </a:r>
+            <a:r>
+              <a:rPr/>
+              <a:t> </a:t>
+            </a:r>
+            <a:r>
+              <a:rPr/>
+              <a:t>barchart</a:t>
+            </a:r>
+            <a:r>
+              <a:rPr/>
+              <a:t> </a:t>
+            </a:r>
+            <a:r>
+              <a:rPr/>
+              <a:t>shows</a:t>
+            </a:r>
+            <a:r>
+              <a:rPr/>
+              <a:t> </a:t>
+            </a:r>
+            <a:r>
+              <a:rPr/>
+              <a:t>that</a:t>
+            </a:r>
+            <a:r>
+              <a:rPr/>
+              <a:t> </a:t>
+            </a:r>
+            <a:r>
+              <a:rPr/>
+              <a:t>setting</a:t>
+            </a:r>
+            <a:r>
+              <a:rPr/>
+              <a:t> </a:t>
+            </a:r>
+            <a:r>
+              <a:rPr/>
+              <a:t>up</a:t>
+            </a:r>
+            <a:r>
+              <a:rPr/>
+              <a:t> </a:t>
+            </a:r>
+            <a:r>
+              <a:rPr/>
+              <a:t>a</a:t>
+            </a:r>
+            <a:r>
+              <a:rPr/>
+              <a:t> </a:t>
+            </a:r>
+            <a:r>
+              <a:rPr/>
+              <a:t>co-ed</a:t>
+            </a:r>
+            <a:r>
+              <a:rPr/>
+              <a:t> </a:t>
+            </a:r>
+            <a:r>
+              <a:rPr/>
+              <a:t>volleyball</a:t>
+            </a:r>
+            <a:r>
+              <a:rPr/>
+              <a:t> </a:t>
+            </a:r>
+            <a:r>
+              <a:rPr/>
+              <a:t>team</a:t>
+            </a:r>
+            <a:r>
+              <a:rPr/>
+              <a:t> </a:t>
+            </a:r>
+            <a:r>
+              <a:rPr/>
+              <a:t>would</a:t>
+            </a:r>
+            <a:r>
+              <a:rPr/>
+              <a:t> </a:t>
+            </a:r>
+            <a:r>
+              <a:rPr/>
+              <a:t>be</a:t>
+            </a:r>
+            <a:r>
+              <a:rPr/>
+              <a:t> </a:t>
+            </a:r>
+            <a:r>
+              <a:rPr/>
+              <a:t>a</a:t>
+            </a:r>
+            <a:r>
+              <a:rPr/>
+              <a:t> </a:t>
+            </a:r>
+            <a:r>
+              <a:rPr/>
+              <a:t>lot</a:t>
+            </a:r>
+            <a:r>
+              <a:rPr/>
+              <a:t> </a:t>
+            </a:r>
+            <a:r>
+              <a:rPr/>
+              <a:t>easier</a:t>
+            </a:r>
+            <a:r>
+              <a:rPr/>
+              <a:t> </a:t>
+            </a:r>
+            <a:r>
+              <a:rPr/>
+              <a:t>in</a:t>
+            </a:r>
+            <a:r>
+              <a:rPr/>
+              <a:t> </a:t>
+            </a:r>
+            <a:r>
+              <a:rPr/>
+              <a:t>first</a:t>
+            </a:r>
+            <a:r>
+              <a:rPr/>
+              <a:t> </a:t>
+            </a:r>
+            <a:r>
+              <a:rPr/>
+              <a:t>or</a:t>
+            </a:r>
+            <a:r>
+              <a:rPr/>
+              <a:t> </a:t>
+            </a:r>
+            <a:r>
+              <a:rPr/>
+              <a:t>second</a:t>
+            </a:r>
+            <a:r>
+              <a:rPr/>
+              <a:t> </a:t>
+            </a:r>
+            <a:r>
+              <a:rPr/>
+              <a:t>class,</a:t>
+            </a:r>
+            <a:r>
+              <a:rPr/>
+              <a:t> </a:t>
+            </a:r>
+            <a:r>
+              <a:rPr/>
+              <a:t>which</a:t>
+            </a:r>
+            <a:r>
+              <a:rPr/>
+              <a:t> </a:t>
+            </a:r>
+            <a:r>
+              <a:rPr/>
+              <a:t>have</a:t>
+            </a:r>
+            <a:r>
+              <a:rPr/>
+              <a:t> </a:t>
+            </a:r>
+            <a:r>
+              <a:rPr/>
+              <a:t>a</a:t>
+            </a:r>
+            <a:r>
+              <a:rPr/>
+              <a:t> </a:t>
+            </a:r>
+            <a:r>
+              <a:rPr/>
+              <a:t>roughly</a:t>
+            </a:r>
+            <a:r>
+              <a:rPr/>
+              <a:t> </a:t>
+            </a:r>
+            <a:r>
+              <a:rPr/>
+              <a:t>equal</a:t>
+            </a:r>
+            <a:r>
+              <a:rPr/>
+              <a:t> </a:t>
+            </a:r>
+            <a:r>
+              <a:rPr/>
+              <a:t>distribution</a:t>
+            </a:r>
+            <a:r>
+              <a:rPr/>
+              <a:t> </a:t>
+            </a:r>
+            <a:r>
+              <a:rPr/>
+              <a:t>of</a:t>
+            </a:r>
+            <a:r>
+              <a:rPr/>
+              <a:t> </a:t>
+            </a:r>
+            <a:r>
+              <a:rPr/>
+              <a:t>mean</a:t>
+            </a:r>
+            <a:r>
+              <a:rPr/>
+              <a:t> </a:t>
+            </a:r>
+            <a:r>
+              <a:rPr/>
+              <a:t>and</a:t>
+            </a:r>
+            <a:r>
+              <a:rPr/>
+              <a:t> </a:t>
+            </a:r>
+            <a:r>
+              <a:rPr/>
+              <a:t>women</a:t>
+            </a:r>
+            <a:r>
+              <a:rPr/>
+              <a:t> </a:t>
+            </a:r>
+            <a:r>
+              <a:rPr/>
+              <a:t>compared</a:t>
+            </a:r>
+            <a:r>
+              <a:rPr/>
+              <a:t> </a:t>
+            </a:r>
+            <a:r>
+              <a:rPr/>
+              <a:t>to</a:t>
+            </a:r>
+            <a:r>
+              <a:rPr/>
+              <a:t> </a:t>
+            </a:r>
+            <a:r>
+              <a:rPr/>
+              <a:t>third</a:t>
+            </a:r>
+            <a:r>
+              <a:rPr/>
+              <a:t> </a:t>
+            </a:r>
+            <a:r>
+              <a:rPr/>
+              <a:t>class.</a:t>
+            </a:r>
+          </a:p>
+        </p:txBody>
+      </p:sp>
+      <p:sp>
+        <p:nvSpPr>
+          <p:cNvPr id="4" name="Slide Number Placeholder 3"/>
+          <p:cNvSpPr>
+            <a:spLocks noGrp="1"/>
+          </p:cNvSpPr>
+          <p:nvPr>
+            <p:ph type="sldNum" sz="quarter" idx="10"/>
+          </p:nvPr>
+        </p:nvSpPr>
+        <p:spPr/>
+        <p:txBody>
+          <a:bodyPr/>
+          <a:lstStyle/>
+          <a:p>
+            <a:fld id="{18BDFEC3-8487-43E8-A154-7C12CBC1FFF2}" type="slidenum">
+              <a:rPr lang="en-US"/>
+              <a:t>16</a:t>
+            </a:fld>
+            <a:endParaRPr lang="en-US"/>
+          </a:p>
+        </p:txBody>
+      </p:sp>
+    </p:spTree>
+  </p:cSld>
+</p:notes>
+</file>
+
+<file path=ppt/notesSlides/notesSlide16.xml><?xml version="1.0" encoding="utf-8"?>
+<p:notes xmlns:a="http://schemas.openxmlformats.org/drawingml/2006/main" xmlns:r="http://schemas.openxmlformats.org/officeDocument/2006/relationships" xmlns:p="http://schemas.openxmlformats.org/presentationml/2006/main">
+  <p:cSld>
+    <p:spTree>
+      <p:nvGrpSpPr>
+        <p:cNvPr id="1" name=""/>
+        <p:cNvGrpSpPr/>
+        <p:nvPr/>
+      </p:nvGrpSpPr>
+      <p:grpSpPr>
+        <a:xfrm>
+          <a:off x="0" y="0"/>
+          <a:ext cx="0" cy="0"/>
+          <a:chOff x="0" y="0"/>
+          <a:chExt cx="0" cy="0"/>
+        </a:xfrm>
+      </p:grpSpPr>
+      <p:sp>
+        <p:nvSpPr>
+          <p:cNvPr id="2" name="Slide Image Placeholder 1"/>
+          <p:cNvSpPr>
+            <a:spLocks noGrp="1" noRot="1" noChangeAspect="1"/>
+          </p:cNvSpPr>
+          <p:nvPr>
+            <p:ph type="sldImg"/>
+          </p:nvPr>
+        </p:nvSpPr>
+        <p:spPr/>
+      </p:sp>
+      <p:sp>
+        <p:nvSpPr>
+          <p:cNvPr id="3" name="Notes Placeholder 2"/>
+          <p:cNvSpPr>
+            <a:spLocks noGrp="1"/>
+          </p:cNvSpPr>
+          <p:nvPr>
+            <p:ph type="body" idx="1"/>
+          </p:nvPr>
+        </p:nvSpPr>
+        <p:spPr/>
+        <p:txBody>
+          <a:bodyPr/>
+          <a:lstStyle/>
+          <a:p>
+            <a:pPr lvl="0" marL="0" indent="0">
+              <a:buNone/>
+            </a:pPr>
+            <a:r>
+              <a:rPr/>
+              <a:t>When</a:t>
+            </a:r>
+            <a:r>
+              <a:rPr/>
+              <a:t> </a:t>
+            </a:r>
+            <a:r>
+              <a:rPr/>
+              <a:t>you</a:t>
+            </a:r>
+            <a:r>
+              <a:rPr/>
+              <a:t> </a:t>
+            </a:r>
+            <a:r>
+              <a:rPr/>
+              <a:t>are</a:t>
+            </a:r>
+            <a:r>
+              <a:rPr/>
+              <a:t> </a:t>
+            </a:r>
+            <a:r>
+              <a:rPr/>
+              <a:t>computing</a:t>
+            </a:r>
+            <a:r>
+              <a:rPr/>
+              <a:t> </a:t>
+            </a:r>
+            <a:r>
+              <a:rPr/>
+              <a:t>percentages,</a:t>
+            </a:r>
+            <a:r>
+              <a:rPr/>
+              <a:t> </a:t>
+            </a:r>
+            <a:r>
+              <a:rPr/>
+              <a:t>you</a:t>
+            </a:r>
+            <a:r>
+              <a:rPr/>
+              <a:t> </a:t>
+            </a:r>
+            <a:r>
+              <a:rPr/>
+              <a:t>need</a:t>
+            </a:r>
+            <a:r>
+              <a:rPr/>
+              <a:t> </a:t>
+            </a:r>
+            <a:r>
+              <a:rPr/>
+              <a:t>to</a:t>
+            </a:r>
+            <a:r>
+              <a:rPr/>
+              <a:t> </a:t>
+            </a:r>
+            <a:r>
+              <a:rPr/>
+              <a:t>decide</a:t>
+            </a:r>
+            <a:r>
+              <a:rPr/>
+              <a:t> </a:t>
+            </a:r>
+            <a:r>
+              <a:rPr/>
+              <a:t>what</a:t>
+            </a:r>
+            <a:r>
+              <a:rPr/>
+              <a:t> </a:t>
+            </a:r>
+            <a:r>
+              <a:rPr/>
+              <a:t>particular</a:t>
+            </a:r>
+            <a:r>
+              <a:rPr/>
+              <a:t> </a:t>
+            </a:r>
+            <a:r>
+              <a:rPr/>
+              <a:t>percentage</a:t>
+            </a:r>
+            <a:r>
+              <a:rPr/>
+              <a:t> </a:t>
+            </a:r>
+            <a:r>
+              <a:rPr/>
+              <a:t>you</a:t>
+            </a:r>
+            <a:r>
+              <a:rPr/>
+              <a:t> </a:t>
+            </a:r>
+            <a:r>
+              <a:rPr/>
+              <a:t>want.</a:t>
+            </a:r>
+            <a:r>
+              <a:rPr/>
+              <a:t> </a:t>
+            </a:r>
+            <a:r>
+              <a:rPr/>
+              <a:t>The</a:t>
+            </a:r>
+            <a:r>
+              <a:rPr/>
+              <a:t> </a:t>
+            </a:r>
+            <a:r>
+              <a:rPr/>
+              <a:t>data</a:t>
+            </a:r>
+            <a:r>
+              <a:rPr/>
+              <a:t> </a:t>
+            </a:r>
+            <a:r>
+              <a:rPr/>
+              <a:t>set</a:t>
+            </a:r>
+            <a:r>
+              <a:rPr/>
+              <a:t> </a:t>
+            </a:r>
+            <a:r>
+              <a:rPr/>
+              <a:t>shown</a:t>
+            </a:r>
+            <a:r>
+              <a:rPr/>
+              <a:t> </a:t>
+            </a:r>
+            <a:r>
+              <a:rPr/>
+              <a:t>above</a:t>
+            </a:r>
+            <a:r>
+              <a:rPr/>
+              <a:t> </a:t>
+            </a:r>
+            <a:r>
+              <a:rPr/>
+              <a:t>is</a:t>
+            </a:r>
+            <a:r>
+              <a:rPr/>
+              <a:t> </a:t>
+            </a:r>
+            <a:r>
+              <a:rPr/>
+              <a:t>totally</a:t>
+            </a:r>
+            <a:r>
+              <a:rPr/>
+              <a:t> </a:t>
+            </a:r>
+            <a:r>
+              <a:rPr/>
+              <a:t>fictional,</a:t>
+            </a:r>
+            <a:r>
+              <a:rPr/>
+              <a:t> </a:t>
+            </a:r>
+            <a:r>
+              <a:rPr/>
+              <a:t>but</a:t>
+            </a:r>
+            <a:r>
+              <a:rPr/>
+              <a:t> </a:t>
+            </a:r>
+            <a:r>
+              <a:rPr/>
+              <a:t>it</a:t>
+            </a:r>
+            <a:r>
+              <a:rPr/>
+              <a:t> </a:t>
+            </a:r>
+            <a:r>
+              <a:rPr/>
+              <a:t>helps</a:t>
+            </a:r>
+            <a:r>
+              <a:rPr/>
+              <a:t> </a:t>
+            </a:r>
+            <a:r>
+              <a:rPr/>
+              <a:t>you</a:t>
+            </a:r>
+            <a:r>
+              <a:rPr/>
+              <a:t> </a:t>
+            </a:r>
+            <a:r>
+              <a:rPr/>
+              <a:t>understand</a:t>
+            </a:r>
+            <a:r>
+              <a:rPr/>
+              <a:t> </a:t>
+            </a:r>
+            <a:r>
+              <a:rPr/>
+              <a:t>what</a:t>
+            </a:r>
+            <a:r>
+              <a:rPr/>
+              <a:t> </a:t>
+            </a:r>
+            <a:r>
+              <a:rPr/>
+              <a:t>your</a:t>
+            </a:r>
+            <a:r>
+              <a:rPr/>
+              <a:t> </a:t>
+            </a:r>
+            <a:r>
+              <a:rPr/>
+              <a:t>options</a:t>
+            </a:r>
+            <a:r>
+              <a:rPr/>
+              <a:t> </a:t>
+            </a:r>
+            <a:r>
+              <a:rPr/>
+              <a:t>are.</a:t>
+            </a:r>
+          </a:p>
+          <a:p>
+            <a:pPr lvl="0" marL="0" indent="0">
+              <a:buNone/>
+            </a:pPr>
+          </a:p>
+          <a:p>
+            <a:pPr lvl="0" marL="0" indent="0">
+              <a:buNone/>
+            </a:pPr>
+            <a:r>
+              <a:rPr/>
+              <a:t>This</a:t>
+            </a:r>
+            <a:r>
+              <a:rPr/>
+              <a:t> </a:t>
+            </a:r>
+            <a:r>
+              <a:rPr/>
+              <a:t>represents</a:t>
+            </a:r>
+            <a:r>
+              <a:rPr/>
+              <a:t> </a:t>
+            </a:r>
+            <a:r>
+              <a:rPr/>
+              <a:t>a</a:t>
+            </a:r>
+            <a:r>
+              <a:rPr/>
+              <a:t> </a:t>
+            </a:r>
+            <a:r>
+              <a:rPr/>
+              <a:t>sample</a:t>
+            </a:r>
+            <a:r>
+              <a:rPr/>
+              <a:t> </a:t>
+            </a:r>
+            <a:r>
+              <a:rPr/>
+              <a:t>of</a:t>
+            </a:r>
+            <a:r>
+              <a:rPr/>
+              <a:t> </a:t>
+            </a:r>
+            <a:r>
+              <a:rPr/>
+              <a:t>200</a:t>
+            </a:r>
+            <a:r>
+              <a:rPr/>
+              <a:t> </a:t>
+            </a:r>
+            <a:r>
+              <a:rPr/>
+              <a:t>people</a:t>
+            </a:r>
+            <a:r>
+              <a:rPr/>
+              <a:t> </a:t>
+            </a:r>
+            <a:r>
+              <a:rPr/>
+              <a:t>who</a:t>
+            </a:r>
+            <a:r>
+              <a:rPr/>
+              <a:t> </a:t>
+            </a:r>
+            <a:r>
+              <a:rPr/>
+              <a:t>are</a:t>
+            </a:r>
+            <a:r>
+              <a:rPr/>
+              <a:t> </a:t>
+            </a:r>
+            <a:r>
+              <a:rPr/>
+              <a:t>classified</a:t>
+            </a:r>
+            <a:r>
+              <a:rPr/>
+              <a:t> </a:t>
+            </a:r>
+            <a:r>
+              <a:rPr/>
+              <a:t>by</a:t>
+            </a:r>
+            <a:r>
+              <a:rPr/>
+              <a:t> </a:t>
+            </a:r>
+            <a:r>
+              <a:rPr/>
+              <a:t>income</a:t>
+            </a:r>
+            <a:r>
+              <a:rPr/>
+              <a:t> </a:t>
+            </a:r>
+            <a:r>
+              <a:rPr/>
+              <a:t>(rich</a:t>
+            </a:r>
+            <a:r>
+              <a:rPr/>
+              <a:t> </a:t>
+            </a:r>
+            <a:r>
+              <a:rPr/>
+              <a:t>or</a:t>
+            </a:r>
+            <a:r>
+              <a:rPr/>
+              <a:t> </a:t>
+            </a:r>
+            <a:r>
+              <a:rPr/>
+              <a:t>poor)</a:t>
+            </a:r>
+            <a:r>
+              <a:rPr/>
+              <a:t> </a:t>
+            </a:r>
+            <a:r>
+              <a:rPr/>
+              <a:t>and</a:t>
+            </a:r>
+            <a:r>
+              <a:rPr/>
+              <a:t> </a:t>
+            </a:r>
+            <a:r>
+              <a:rPr/>
+              <a:t>by</a:t>
+            </a:r>
+            <a:r>
+              <a:rPr/>
+              <a:t> </a:t>
+            </a:r>
+            <a:r>
+              <a:rPr/>
+              <a:t>outlook</a:t>
+            </a:r>
+            <a:r>
+              <a:rPr/>
+              <a:t> </a:t>
+            </a:r>
+            <a:r>
+              <a:rPr/>
+              <a:t>(happy</a:t>
+            </a:r>
+            <a:r>
+              <a:rPr/>
+              <a:t> </a:t>
+            </a:r>
+            <a:r>
+              <a:rPr/>
+              <a:t>or</a:t>
+            </a:r>
+            <a:r>
+              <a:rPr/>
+              <a:t> </a:t>
+            </a:r>
+            <a:r>
+              <a:rPr/>
+              <a:t>miserable).</a:t>
+            </a:r>
+          </a:p>
+        </p:txBody>
+      </p:sp>
+      <p:sp>
+        <p:nvSpPr>
+          <p:cNvPr id="4" name="Slide Number Placeholder 3"/>
+          <p:cNvSpPr>
+            <a:spLocks noGrp="1"/>
+          </p:cNvSpPr>
+          <p:nvPr>
+            <p:ph type="sldNum" sz="quarter" idx="10"/>
+          </p:nvPr>
+        </p:nvSpPr>
+        <p:spPr/>
+        <p:txBody>
+          <a:bodyPr/>
+          <a:lstStyle/>
+          <a:p>
+            <a:fld id="{18BDFEC3-8487-43E8-A154-7C12CBC1FFF2}" type="slidenum">
+              <a:rPr lang="en-US"/>
+              <a:t>17</a:t>
             </a:fld>
             <a:endParaRPr lang="en-US"/>
           </a:p>
@@ -17314,7 +18262,7 @@
           <p:nvPr/>
         </p:nvPicPr>
         <p:blipFill>
-          <a:blip r:embed="rId2"/>
+          <a:blip r:embed="rId3"/>
           <a:stretch>
             <a:fillRect/>
           </a:stretch>
@@ -17453,7 +18401,7 @@
           <p:nvPr/>
         </p:nvPicPr>
         <p:blipFill>
-          <a:blip r:embed="rId2"/>
+          <a:blip r:embed="rId3"/>
           <a:stretch>
             <a:fillRect/>
           </a:stretch>
@@ -17865,6 +18813,129 @@
       </p:grpSpPr>
       <p:sp>
         <p:nvSpPr>
+          <p:cNvPr id="3" name="Content Placeholder 2"/>
+          <p:cNvSpPr>
+            <a:spLocks noGrp="1"/>
+          </p:cNvSpPr>
+          <p:nvPr>
+            <p:ph idx="1"/>
+          </p:nvPr>
+        </p:nvSpPr>
+        <p:spPr/>
+        <p:txBody>
+          <a:bodyPr/>
+          <a:lstStyle/>
+          <a:p>
+            <a:pPr lvl="0" marL="0" indent="0">
+              <a:buNone/>
+            </a:pPr>
+            <a:r>
+              <a:rPr/>
+              <a:t>You can compute row percentages which divide the entry in each row by the row total. Row percents add up to 100% within each row.</a:t>
+            </a:r>
+          </a:p>
+          <a:p>
+            <a:pPr lvl="0" marL="1270000" indent="0">
+              <a:buNone/>
+            </a:pPr>
+            <a:r>
+              <a:rPr sz="1800">
+                <a:latin typeface="Courier"/>
+              </a:rPr>
+              <a:t>## Warning in rep(rep(c("Rich", "Poor"), each = 2), each = n): first element
+## used of 'each' argument</a:t>
+            </a:r>
+          </a:p>
+          <a:p>
+            <a:pPr lvl="0" marL="1270000" indent="0">
+              <a:buNone/>
+            </a:pPr>
+            <a:r>
+              <a:rPr sz="1800">
+                <a:latin typeface="Courier"/>
+              </a:rPr>
+              <a:t>## Warning in rep(rep(c("Happy", "Miserable"), 2), each = n): first element
+## used of 'each' argument</a:t>
+            </a:r>
+          </a:p>
+        </p:txBody>
+      </p:sp>
+    </p:spTree>
+  </p:cSld>
+</p:sld>
+</file>
+
+<file path=ppt/slides/slide21.xml><?xml version="1.0" encoding="utf-8"?>
+<p:sld xmlns:a="http://schemas.openxmlformats.org/drawingml/2006/main" xmlns:r="http://schemas.openxmlformats.org/officeDocument/2006/relationships" xmlns:p="http://schemas.openxmlformats.org/presentationml/2006/main">
+  <p:cSld>
+    <p:spTree>
+      <p:nvGrpSpPr>
+        <p:cNvPr id="1" name=""/>
+        <p:cNvGrpSpPr/>
+        <p:nvPr/>
+      </p:nvGrpSpPr>
+      <p:grpSpPr>
+        <a:xfrm>
+          <a:off x="0" y="0"/>
+          <a:ext cx="0" cy="0"/>
+          <a:chOff x="0" y="0"/>
+          <a:chExt cx="0" cy="0"/>
+        </a:xfrm>
+      </p:grpSpPr>
+      <p:pic>
+        <p:nvPicPr>
+          <p:cNvPr descr="../images/r/outlook-stack.png" id="0" name="Picture 1"/>
+          <p:cNvPicPr>
+            <a:picLocks noGrp="1" noChangeAspect="1"/>
+          </p:cNvPicPr>
+          <p:nvPr/>
+        </p:nvPicPr>
+        <p:blipFill>
+          <a:blip r:embed="rId2"/>
+          <a:stretch>
+            <a:fillRect/>
+          </a:stretch>
+        </p:blipFill>
+        <p:spPr bwMode="auto">
+          <a:xfrm>
+            <a:off x="2311400" y="1600200"/>
+            <a:ext cx="4521200" cy="4521200"/>
+          </a:xfrm>
+          <a:prstGeom prst="rect">
+            <a:avLst/>
+          </a:prstGeom>
+          <a:noFill/>
+          <a:ln w="9525">
+            <a:noFill/>
+            <a:headEnd/>
+            <a:tailEnd/>
+          </a:ln>
+        </p:spPr>
+      </p:pic>
+    </p:spTree>
+  </p:cSld>
+</p:sld>
+</file>
+
+<file path=ppt/slides/slide22.xml><?xml version="1.0" encoding="utf-8"?>
+<p:sld xmlns:a="http://schemas.openxmlformats.org/drawingml/2006/main" xmlns:r="http://schemas.openxmlformats.org/officeDocument/2006/relationships" xmlns:p="http://schemas.openxmlformats.org/presentationml/2006/main">
+  <p:cSld>
+    <p:spTree>
+      <p:nvGrpSpPr>
+        <p:cNvPr id="1" name=""/>
+        <p:cNvGrpSpPr/>
+        <p:nvPr/>
+      </p:nvGrpSpPr>
+      <p:grpSpPr>
+        <a:xfrm>
+          <a:off x="0" y="0"/>
+          <a:ext cx="0" cy="0"/>
+          <a:chOff x="0" y="0"/>
+          <a:chExt cx="0" cy="0"/>
+        </a:xfrm>
+      </p:grpSpPr>
+      <p:sp>
+        <p:nvSpPr>
           <p:cNvPr id="2" name="Title 1"/>
           <p:cNvSpPr>
             <a:spLocks noGrp="1"/>
@@ -17931,7 +19002,7 @@
 </p:sld>
 </file>
 
-<file path=ppt/slides/slide21.xml><?xml version="1.0" encoding="utf-8"?>
+<file path=ppt/slides/slide23.xml><?xml version="1.0" encoding="utf-8"?>
 <p:sld xmlns:a="http://schemas.openxmlformats.org/drawingml/2006/main" xmlns:r="http://schemas.openxmlformats.org/officeDocument/2006/relationships" xmlns:p="http://schemas.openxmlformats.org/presentationml/2006/main">
   <p:cSld>
     <p:spTree>

</xml_diff>

<commit_message>
Worked on percentages in data-viz-02
</commit_message>
<xml_diff>
--- a/data-viz-02/component/recommendations-barcharts.pptx
+++ b/data-viz-02/component/recommendations-barcharts.pptx
@@ -5674,6 +5674,280 @@
             <a:fld id="{18BDFEC3-8487-43E8-A154-7C12CBC1FFF2}" type="slidenum">
               <a:rPr lang="en-US"/>
               <a:t>17</a:t>
+            </a:fld>
+            <a:endParaRPr lang="en-US"/>
+          </a:p>
+        </p:txBody>
+      </p:sp>
+    </p:spTree>
+  </p:cSld>
+</p:notes>
+</file>
+
+<file path=ppt/notesSlides/notesSlide17.xml><?xml version="1.0" encoding="utf-8"?>
+<p:notes xmlns:a="http://schemas.openxmlformats.org/drawingml/2006/main" xmlns:r="http://schemas.openxmlformats.org/officeDocument/2006/relationships" xmlns:p="http://schemas.openxmlformats.org/presentationml/2006/main">
+  <p:cSld>
+    <p:spTree>
+      <p:nvGrpSpPr>
+        <p:cNvPr id="1" name=""/>
+        <p:cNvGrpSpPr/>
+        <p:nvPr/>
+      </p:nvGrpSpPr>
+      <p:grpSpPr>
+        <a:xfrm>
+          <a:off x="0" y="0"/>
+          <a:ext cx="0" cy="0"/>
+          <a:chOff x="0" y="0"/>
+          <a:chExt cx="0" cy="0"/>
+        </a:xfrm>
+      </p:grpSpPr>
+      <p:sp>
+        <p:nvSpPr>
+          <p:cNvPr id="2" name="Slide Image Placeholder 1"/>
+          <p:cNvSpPr>
+            <a:spLocks noGrp="1" noRot="1" noChangeAspect="1"/>
+          </p:cNvSpPr>
+          <p:nvPr>
+            <p:ph type="sldImg"/>
+          </p:nvPr>
+        </p:nvSpPr>
+        <p:spPr/>
+      </p:sp>
+      <p:sp>
+        <p:nvSpPr>
+          <p:cNvPr id="3" name="Notes Placeholder 2"/>
+          <p:cNvSpPr>
+            <a:spLocks noGrp="1"/>
+          </p:cNvSpPr>
+          <p:nvPr>
+            <p:ph type="body" idx="1"/>
+          </p:nvPr>
+        </p:nvSpPr>
+        <p:spPr/>
+        <p:txBody>
+          <a:bodyPr/>
+          <a:lstStyle/>
+          <a:p>
+            <a:pPr lvl="0" marL="0" indent="0">
+              <a:buNone/>
+            </a:pPr>
+            <a:r>
+              <a:rPr/>
+              <a:t>You</a:t>
+            </a:r>
+            <a:r>
+              <a:rPr/>
+              <a:t> </a:t>
+            </a:r>
+            <a:r>
+              <a:rPr/>
+              <a:t>can</a:t>
+            </a:r>
+            <a:r>
+              <a:rPr/>
+              <a:t> </a:t>
+            </a:r>
+            <a:r>
+              <a:rPr/>
+              <a:t>compute</a:t>
+            </a:r>
+            <a:r>
+              <a:rPr/>
+              <a:t> </a:t>
+            </a:r>
+            <a:r>
+              <a:rPr/>
+              <a:t>row</a:t>
+            </a:r>
+            <a:r>
+              <a:rPr/>
+              <a:t> </a:t>
+            </a:r>
+            <a:r>
+              <a:rPr/>
+              <a:t>percentages</a:t>
+            </a:r>
+            <a:r>
+              <a:rPr/>
+              <a:t> </a:t>
+            </a:r>
+            <a:r>
+              <a:rPr/>
+              <a:t>which</a:t>
+            </a:r>
+            <a:r>
+              <a:rPr/>
+              <a:t> </a:t>
+            </a:r>
+            <a:r>
+              <a:rPr/>
+              <a:t>divide</a:t>
+            </a:r>
+            <a:r>
+              <a:rPr/>
+              <a:t> </a:t>
+            </a:r>
+            <a:r>
+              <a:rPr/>
+              <a:t>the</a:t>
+            </a:r>
+            <a:r>
+              <a:rPr/>
+              <a:t> </a:t>
+            </a:r>
+            <a:r>
+              <a:rPr/>
+              <a:t>entry</a:t>
+            </a:r>
+            <a:r>
+              <a:rPr/>
+              <a:t> </a:t>
+            </a:r>
+            <a:r>
+              <a:rPr/>
+              <a:t>in</a:t>
+            </a:r>
+            <a:r>
+              <a:rPr/>
+              <a:t> </a:t>
+            </a:r>
+            <a:r>
+              <a:rPr/>
+              <a:t>each</a:t>
+            </a:r>
+            <a:r>
+              <a:rPr/>
+              <a:t> </a:t>
+            </a:r>
+            <a:r>
+              <a:rPr/>
+              <a:t>row</a:t>
+            </a:r>
+            <a:r>
+              <a:rPr/>
+              <a:t> </a:t>
+            </a:r>
+            <a:r>
+              <a:rPr/>
+              <a:t>by</a:t>
+            </a:r>
+            <a:r>
+              <a:rPr/>
+              <a:t> </a:t>
+            </a:r>
+            <a:r>
+              <a:rPr/>
+              <a:t>the</a:t>
+            </a:r>
+            <a:r>
+              <a:rPr/>
+              <a:t> </a:t>
+            </a:r>
+            <a:r>
+              <a:rPr/>
+              <a:t>row</a:t>
+            </a:r>
+            <a:r>
+              <a:rPr/>
+              <a:t> </a:t>
+            </a:r>
+            <a:r>
+              <a:rPr/>
+              <a:t>total.</a:t>
+            </a:r>
+            <a:r>
+              <a:rPr/>
+              <a:t> </a:t>
+            </a:r>
+            <a:r>
+              <a:rPr/>
+              <a:t>Row</a:t>
+            </a:r>
+            <a:r>
+              <a:rPr/>
+              <a:t> </a:t>
+            </a:r>
+            <a:r>
+              <a:rPr/>
+              <a:t>percents</a:t>
+            </a:r>
+            <a:r>
+              <a:rPr/>
+              <a:t> </a:t>
+            </a:r>
+            <a:r>
+              <a:rPr/>
+              <a:t>add</a:t>
+            </a:r>
+            <a:r>
+              <a:rPr/>
+              <a:t> </a:t>
+            </a:r>
+            <a:r>
+              <a:rPr/>
+              <a:t>up</a:t>
+            </a:r>
+            <a:r>
+              <a:rPr/>
+              <a:t> </a:t>
+            </a:r>
+            <a:r>
+              <a:rPr/>
+              <a:t>to</a:t>
+            </a:r>
+            <a:r>
+              <a:rPr/>
+              <a:t> </a:t>
+            </a:r>
+            <a:r>
+              <a:rPr/>
+              <a:t>100%</a:t>
+            </a:r>
+            <a:r>
+              <a:rPr/>
+              <a:t> </a:t>
+            </a:r>
+            <a:r>
+              <a:rPr/>
+              <a:t>within</a:t>
+            </a:r>
+            <a:r>
+              <a:rPr/>
+              <a:t> </a:t>
+            </a:r>
+            <a:r>
+              <a:rPr/>
+              <a:t>each</a:t>
+            </a:r>
+            <a:r>
+              <a:rPr/>
+              <a:t> </a:t>
+            </a:r>
+            <a:r>
+              <a:rPr/>
+              <a:t>row.</a:t>
+            </a:r>
+          </a:p>
+        </p:txBody>
+      </p:sp>
+      <p:sp>
+        <p:nvSpPr>
+          <p:cNvPr id="4" name="Slide Number Placeholder 3"/>
+          <p:cNvSpPr>
+            <a:spLocks noGrp="1"/>
+          </p:cNvSpPr>
+          <p:nvPr>
+            <p:ph type="sldNum" sz="quarter" idx="10"/>
+          </p:nvPr>
+        </p:nvSpPr>
+        <p:spPr/>
+        <p:txBody>
+          <a:bodyPr/>
+          <a:lstStyle/>
+          <a:p>
+            <a:fld id="{18BDFEC3-8487-43E8-A154-7C12CBC1FFF2}" type="slidenum">
+              <a:rPr lang="en-US"/>
+              <a:t>18</a:t>
             </a:fld>
             <a:endParaRPr lang="en-US"/>
           </a:p>
@@ -18464,11 +18738,49 @@
             </a:pPr>
             <a:r>
               <a:rPr/>
-              <a:t>Data</a:t>
+              <a:t>Which</a:t>
+            </a:r>
+            <a:r>
+              <a:rPr/>
+              <a:t> </a:t>
+            </a:r>
+            <a:r>
+              <a:rPr/>
+              <a:t>percentage</a:t>
             </a:r>
           </a:p>
         </p:txBody>
       </p:sp>
+      <p:pic>
+        <p:nvPicPr>
+          <p:cNvPr descr="../images/external/happiness-row-percents.gif" id="0" name="Picture 1"/>
+          <p:cNvPicPr>
+            <a:picLocks noGrp="1" noChangeAspect="1"/>
+          </p:cNvPicPr>
+          <p:nvPr/>
+        </p:nvPicPr>
+        <p:blipFill>
+          <a:blip r:embed="rId3"/>
+          <a:stretch>
+            <a:fillRect/>
+          </a:stretch>
+        </p:blipFill>
+        <p:spPr bwMode="auto">
+          <a:xfrm>
+            <a:off x="457200" y="1790700"/>
+            <a:ext cx="8229600" cy="4140200"/>
+          </a:xfrm>
+          <a:prstGeom prst="rect">
+            <a:avLst/>
+          </a:prstGeom>
+          <a:noFill/>
+          <a:ln w="9525">
+            <a:noFill/>
+            <a:headEnd/>
+            <a:tailEnd/>
+          </a:ln>
+        </p:spPr>
+      </p:pic>
     </p:spTree>
   </p:cSld>
 </p:sld>
@@ -18491,42 +18803,9 @@
           <a:chExt cx="0" cy="0"/>
         </a:xfrm>
       </p:grpSpPr>
-      <p:sp>
-        <p:nvSpPr>
-          <p:cNvPr id="2" name="Title 1"/>
-          <p:cNvSpPr>
-            <a:spLocks noGrp="1"/>
-          </p:cNvSpPr>
-          <p:nvPr>
-            <p:ph type="title"/>
-          </p:nvPr>
-        </p:nvSpPr>
-        <p:spPr/>
-        <p:txBody>
-          <a:bodyPr/>
-          <a:lstStyle/>
-          <a:p>
-            <a:pPr lvl="0" marL="0" indent="0">
-              <a:buNone/>
-            </a:pPr>
-            <a:r>
-              <a:rPr/>
-              <a:t>Which</a:t>
-            </a:r>
-            <a:r>
-              <a:rPr/>
-              <a:t> </a:t>
-            </a:r>
-            <a:r>
-              <a:rPr/>
-              <a:t>percentage</a:t>
-            </a:r>
-          </a:p>
-        </p:txBody>
-      </p:sp>
       <p:pic>
         <p:nvPicPr>
-          <p:cNvPr descr="../images/external/happiness-row-percents.gif" id="0" name="Picture 1"/>
+          <p:cNvPr descr="../images/r/outlook-stack.png" id="0" name="Picture 1"/>
           <p:cNvPicPr>
             <a:picLocks noGrp="1" noChangeAspect="1"/>
           </p:cNvPicPr>
@@ -18540,8 +18819,8 @@
         </p:blipFill>
         <p:spPr bwMode="auto">
           <a:xfrm>
-            <a:off x="457200" y="1790700"/>
-            <a:ext cx="8229600" cy="4140200"/>
+            <a:off x="2311400" y="1600200"/>
+            <a:ext cx="4521200" cy="4521200"/>
           </a:xfrm>
           <a:prstGeom prst="rect">
             <a:avLst/>
@@ -18813,12 +19092,12 @@
       </p:grpSpPr>
       <p:sp>
         <p:nvSpPr>
-          <p:cNvPr id="3" name="Content Placeholder 2"/>
+          <p:cNvPr id="2" name="Title 1"/>
           <p:cNvSpPr>
             <a:spLocks noGrp="1"/>
           </p:cNvSpPr>
           <p:nvPr>
-            <p:ph idx="1"/>
+            <p:ph type="title"/>
           </p:nvPr>
         </p:nvSpPr>
         <p:spPr/>
@@ -18831,35 +19110,49 @@
             </a:pPr>
             <a:r>
               <a:rPr/>
-              <a:t>You can compute row percentages which divide the entry in each row by the row total. Row percents add up to 100% within each row.</a:t>
-            </a:r>
-          </a:p>
-          <a:p>
-            <a:pPr lvl="0" marL="1270000" indent="0">
-              <a:buNone/>
-            </a:pPr>
-            <a:r>
-              <a:rPr sz="1800">
-                <a:latin typeface="Courier"/>
-              </a:rPr>
-              <a:t>## Warning in rep(rep(c("Rich", "Poor"), each = 2), each = n): first element
-## used of 'each' argument</a:t>
-            </a:r>
-          </a:p>
-          <a:p>
-            <a:pPr lvl="0" marL="1270000" indent="0">
-              <a:buNone/>
-            </a:pPr>
-            <a:r>
-              <a:rPr sz="1800">
-                <a:latin typeface="Courier"/>
-              </a:rPr>
-              <a:t>## Warning in rep(rep(c("Happy", "Miserable"), 2), each = n): first element
-## used of 'each' argument</a:t>
+              <a:t>Which</a:t>
+            </a:r>
+            <a:r>
+              <a:rPr/>
+              <a:t> </a:t>
+            </a:r>
+            <a:r>
+              <a:rPr/>
+              <a:t>percentage</a:t>
             </a:r>
           </a:p>
         </p:txBody>
       </p:sp>
+      <p:pic>
+        <p:nvPicPr>
+          <p:cNvPr descr="../images/external/happiness-column-percents.gif" id="0" name="Picture 1"/>
+          <p:cNvPicPr>
+            <a:picLocks noGrp="1" noChangeAspect="1"/>
+          </p:cNvPicPr>
+          <p:nvPr/>
+        </p:nvPicPr>
+        <p:blipFill>
+          <a:blip r:embed="rId2"/>
+          <a:stretch>
+            <a:fillRect/>
+          </a:stretch>
+        </p:blipFill>
+        <p:spPr bwMode="auto">
+          <a:xfrm>
+            <a:off x="457200" y="1765300"/>
+            <a:ext cx="8229600" cy="4178300"/>
+          </a:xfrm>
+          <a:prstGeom prst="rect">
+            <a:avLst/>
+          </a:prstGeom>
+          <a:noFill/>
+          <a:ln w="9525">
+            <a:noFill/>
+            <a:headEnd/>
+            <a:tailEnd/>
+          </a:ln>
+        </p:spPr>
+      </p:pic>
     </p:spTree>
   </p:cSld>
 </p:sld>
@@ -18884,7 +19177,7 @@
       </p:grpSpPr>
       <p:pic>
         <p:nvPicPr>
-          <p:cNvPr descr="../images/r/outlook-stack.png" id="0" name="Picture 1"/>
+          <p:cNvPr descr="../images/r/income-stack.png" id="0" name="Picture 1"/>
           <p:cNvPicPr>
             <a:picLocks noGrp="1" noChangeAspect="1"/>
           </p:cNvPicPr>
@@ -18969,7 +19262,7 @@
       </p:sp>
       <p:pic>
         <p:nvPicPr>
-          <p:cNvPr descr="../images/external/happiness-column-percents.gif" id="0" name="Picture 1"/>
+          <p:cNvPr descr="../images/external/happiness-cell-percents.gif" id="0" name="Picture 1"/>
           <p:cNvPicPr>
             <a:picLocks noGrp="1" noChangeAspect="1"/>
           </p:cNvPicPr>
@@ -18983,8 +19276,8 @@
         </p:blipFill>
         <p:spPr bwMode="auto">
           <a:xfrm>
-            <a:off x="457200" y="1765300"/>
-            <a:ext cx="8229600" cy="4178300"/>
+            <a:off x="457200" y="1778000"/>
+            <a:ext cx="8229600" cy="4152900"/>
           </a:xfrm>
           <a:prstGeom prst="rect">
             <a:avLst/>
@@ -19019,42 +19312,9 @@
           <a:chExt cx="0" cy="0"/>
         </a:xfrm>
       </p:grpSpPr>
-      <p:sp>
-        <p:nvSpPr>
-          <p:cNvPr id="2" name="Title 1"/>
-          <p:cNvSpPr>
-            <a:spLocks noGrp="1"/>
-          </p:cNvSpPr>
-          <p:nvPr>
-            <p:ph type="title"/>
-          </p:nvPr>
-        </p:nvSpPr>
-        <p:spPr/>
-        <p:txBody>
-          <a:bodyPr/>
-          <a:lstStyle/>
-          <a:p>
-            <a:pPr lvl="0" marL="0" indent="0">
-              <a:buNone/>
-            </a:pPr>
-            <a:r>
-              <a:rPr/>
-              <a:t>Which</a:t>
-            </a:r>
-            <a:r>
-              <a:rPr/>
-              <a:t> </a:t>
-            </a:r>
-            <a:r>
-              <a:rPr/>
-              <a:t>percentage</a:t>
-            </a:r>
-          </a:p>
-        </p:txBody>
-      </p:sp>
       <p:pic>
         <p:nvPicPr>
-          <p:cNvPr descr="../images/external/happiness-cell-percents.gif" id="0" name="Picture 1"/>
+          <p:cNvPr descr="../images/r/cell-stack.png" id="0" name="Picture 1"/>
           <p:cNvPicPr>
             <a:picLocks noGrp="1" noChangeAspect="1"/>
           </p:cNvPicPr>
@@ -19068,8 +19328,8 @@
         </p:blipFill>
         <p:spPr bwMode="auto">
           <a:xfrm>
-            <a:off x="457200" y="1778000"/>
-            <a:ext cx="8229600" cy="4152900"/>
+            <a:off x="2311400" y="1600200"/>
+            <a:ext cx="4521200" cy="4521200"/>
           </a:xfrm>
           <a:prstGeom prst="rect">
             <a:avLst/>

</xml_diff>